<commit_message>
updated project proposal added
</commit_message>
<xml_diff>
--- a/project_01/docs/miller_ENGI301_project_01_proposal.pptx
+++ b/project_01/docs/miller_ENGI301_project_01_proposal.pptx
@@ -218,7 +218,7 @@
           <a:p>
             <a:fld id="{59041DB8-B66F-4DC8-A96E-33677E0F90FF}" type="datetimeFigureOut">
               <a:rPr lang="en-US" smtClean="0"/>
-              <a:t>9/25/2023</a:t>
+              <a:t>10/1/2023</a:t>
             </a:fld>
             <a:endParaRPr lang="en-US"/>
           </a:p>
@@ -383,7 +383,7 @@
           <a:p>
             <a:fld id="{DEB49C4A-65AC-492D-9701-81B46C3AD0E4}" type="datetimeFigureOut">
               <a:rPr lang="en-US" smtClean="0"/>
-              <a:t>9/25/2023</a:t>
+              <a:t>9/28/2023</a:t>
             </a:fld>
             <a:endParaRPr lang="en-US"/>
           </a:p>
@@ -2791,7 +2791,7 @@
           <a:p>
             <a:fld id="{384A29A4-78C8-47AB-BA06-22CB45938951}" type="datetime1">
               <a:rPr lang="en-US" smtClean="0"/>
-              <a:t>9/25/2023</a:t>
+              <a:t>9/28/2023</a:t>
             </a:fld>
             <a:endParaRPr lang="en-US"/>
           </a:p>
@@ -2986,7 +2986,7 @@
           <a:p>
             <a:fld id="{E1ED4ACF-2D82-46F2-A8E9-23963AA34E86}" type="datetime1">
               <a:rPr lang="en-US" smtClean="0"/>
-              <a:t>9/25/2023</a:t>
+              <a:t>9/28/2023</a:t>
             </a:fld>
             <a:endParaRPr lang="en-US"/>
           </a:p>
@@ -3180,7 +3180,7 @@
           <a:p>
             <a:fld id="{AE374B5B-21A0-4192-BF4C-38187F1A68D8}" type="datetime1">
               <a:rPr lang="en-US" smtClean="0"/>
-              <a:t>9/25/2023</a:t>
+              <a:t>9/28/2023</a:t>
             </a:fld>
             <a:endParaRPr lang="en-US"/>
           </a:p>
@@ -5521,7 +5521,7 @@
           <a:p>
             <a:fld id="{33B5CF7C-B333-48E1-A4A6-83A3C8B73AC0}" type="datetime1">
               <a:rPr lang="en-US" smtClean="0"/>
-              <a:t>9/25/2023</a:t>
+              <a:t>9/28/2023</a:t>
             </a:fld>
             <a:endParaRPr lang="en-US"/>
           </a:p>
@@ -5974,7 +5974,7 @@
           <a:p>
             <a:fld id="{AE320762-5CBF-4210-AB54-376B091119F8}" type="datetime1">
               <a:rPr lang="en-US" smtClean="0"/>
-              <a:t>9/25/2023</a:t>
+              <a:t>9/28/2023</a:t>
             </a:fld>
             <a:endParaRPr lang="en-US"/>
           </a:p>
@@ -6106,7 +6106,7 @@
           <a:p>
             <a:fld id="{7F0DB371-BF5F-4058-A212-1A908E4D2674}" type="datetime1">
               <a:rPr lang="en-US" smtClean="0"/>
-              <a:t>9/25/2023</a:t>
+              <a:t>9/28/2023</a:t>
             </a:fld>
             <a:endParaRPr lang="en-US"/>
           </a:p>
@@ -8039,7 +8039,7 @@
           <a:p>
             <a:fld id="{60A4083B-90AA-48CF-BAD5-00AA24D7F288}" type="datetime1">
               <a:rPr lang="en-US" smtClean="0"/>
-              <a:t>9/25/2023</a:t>
+              <a:t>9/28/2023</a:t>
             </a:fld>
             <a:endParaRPr lang="en-US"/>
           </a:p>
@@ -10298,7 +10298,7 @@
             <a:fld id="{F5BAF629-ECA2-4CF3-B790-9D9BDED98269}" type="datetime1">
               <a:rPr lang="en-US" smtClean="0"/>
               <a:pPr/>
-              <a:t>9/25/2023</a:t>
+              <a:t>9/28/2023</a:t>
             </a:fld>
             <a:endParaRPr lang="en-US"/>
           </a:p>
@@ -14593,7 +14593,7 @@
             <a:fld id="{B51B2453-8663-4C69-AF73-9FD7B1DEC5D0}" type="datetime1">
               <a:rPr lang="en-US" smtClean="0"/>
               <a:pPr/>
-              <a:t>9/25/2023</a:t>
+              <a:t>9/28/2023</a:t>
             </a:fld>
             <a:endParaRPr lang="en-US" dirty="0"/>
           </a:p>
@@ -15652,7 +15652,7 @@
             <a:pPr algn="ctr"/>
             <a:r>
               <a:rPr lang="en-US" sz="1000" dirty="0"/>
-              <a:t>1.5A stepper motor</a:t>
+              <a:t>1.5A stepper or servo motor</a:t>
             </a:r>
           </a:p>
         </p:txBody>
@@ -16218,6 +16218,374 @@
           </a:fontRef>
         </p:style>
       </p:cxnSp>
+      <p:sp>
+        <p:nvSpPr>
+          <p:cNvPr id="3" name="Rectangle 2">
+            <a:extLst>
+              <a:ext uri="{FF2B5EF4-FFF2-40B4-BE49-F238E27FC236}">
+                <a16:creationId xmlns:a16="http://schemas.microsoft.com/office/drawing/2014/main" id="{3264340F-FEDD-1692-1FB5-9FB20DCB27FF}"/>
+              </a:ext>
+            </a:extLst>
+          </p:cNvPr>
+          <p:cNvSpPr/>
+          <p:nvPr/>
+        </p:nvSpPr>
+        <p:spPr>
+          <a:xfrm>
+            <a:off x="9067799" y="1866899"/>
+            <a:ext cx="1165381" cy="1045647"/>
+          </a:xfrm>
+          <a:prstGeom prst="rect">
+            <a:avLst/>
+          </a:prstGeom>
+        </p:spPr>
+        <p:style>
+          <a:lnRef idx="2">
+            <a:schemeClr val="accent1">
+              <a:shade val="15000"/>
+            </a:schemeClr>
+          </a:lnRef>
+          <a:fillRef idx="1">
+            <a:schemeClr val="accent1"/>
+          </a:fillRef>
+          <a:effectRef idx="0">
+            <a:schemeClr val="accent1"/>
+          </a:effectRef>
+          <a:fontRef idx="minor">
+            <a:schemeClr val="lt1"/>
+          </a:fontRef>
+        </p:style>
+        <p:txBody>
+          <a:bodyPr rtlCol="0" anchor="ctr"/>
+          <a:lstStyle/>
+          <a:p>
+            <a:pPr algn="ctr"/>
+            <a:r>
+              <a:rPr lang="en-US" sz="1000" dirty="0"/>
+              <a:t>Emergency stop/shutoff button</a:t>
+            </a:r>
+          </a:p>
+        </p:txBody>
+      </p:sp>
+      <p:sp>
+        <p:nvSpPr>
+          <p:cNvPr id="8" name="Rectangle 7">
+            <a:extLst>
+              <a:ext uri="{FF2B5EF4-FFF2-40B4-BE49-F238E27FC236}">
+                <a16:creationId xmlns:a16="http://schemas.microsoft.com/office/drawing/2014/main" id="{E16A96E4-252A-B788-055A-A36CA0307500}"/>
+              </a:ext>
+            </a:extLst>
+          </p:cNvPr>
+          <p:cNvSpPr/>
+          <p:nvPr/>
+        </p:nvSpPr>
+        <p:spPr>
+          <a:xfrm>
+            <a:off x="8610600" y="3409347"/>
+            <a:ext cx="1165381" cy="1045647"/>
+          </a:xfrm>
+          <a:prstGeom prst="rect">
+            <a:avLst/>
+          </a:prstGeom>
+        </p:spPr>
+        <p:style>
+          <a:lnRef idx="2">
+            <a:schemeClr val="accent1">
+              <a:shade val="15000"/>
+            </a:schemeClr>
+          </a:lnRef>
+          <a:fillRef idx="1">
+            <a:schemeClr val="accent1"/>
+          </a:fillRef>
+          <a:effectRef idx="0">
+            <a:schemeClr val="accent1"/>
+          </a:effectRef>
+          <a:fontRef idx="minor">
+            <a:schemeClr val="lt1"/>
+          </a:fontRef>
+        </p:style>
+        <p:txBody>
+          <a:bodyPr rtlCol="0" anchor="ctr"/>
+          <a:lstStyle/>
+          <a:p>
+            <a:pPr algn="ctr"/>
+            <a:r>
+              <a:rPr lang="en-US" sz="1000" dirty="0"/>
+              <a:t>Fan Speed level interface</a:t>
+            </a:r>
+          </a:p>
+        </p:txBody>
+      </p:sp>
+      <p:sp>
+        <p:nvSpPr>
+          <p:cNvPr id="17" name="TextBox 16">
+            <a:extLst>
+              <a:ext uri="{FF2B5EF4-FFF2-40B4-BE49-F238E27FC236}">
+                <a16:creationId xmlns:a16="http://schemas.microsoft.com/office/drawing/2014/main" id="{D87134E9-6FA9-7B88-71E3-45BE9D420EAF}"/>
+              </a:ext>
+            </a:extLst>
+          </p:cNvPr>
+          <p:cNvSpPr txBox="1"/>
+          <p:nvPr/>
+        </p:nvSpPr>
+        <p:spPr>
+          <a:xfrm>
+            <a:off x="9906000" y="3642102"/>
+            <a:ext cx="2019300" cy="830997"/>
+          </a:xfrm>
+          <a:prstGeom prst="rect">
+            <a:avLst/>
+          </a:prstGeom>
+          <a:noFill/>
+        </p:spPr>
+        <p:txBody>
+          <a:bodyPr wrap="square" rtlCol="0">
+            <a:spAutoFit/>
+          </a:bodyPr>
+          <a:lstStyle/>
+          <a:p>
+            <a:r>
+              <a:rPr lang="en-US" sz="1200" dirty="0"/>
+              <a:t>Using either the number display or a series of LEDs to display current fan speed</a:t>
+            </a:r>
+          </a:p>
+        </p:txBody>
+      </p:sp>
+      <p:cxnSp>
+        <p:nvCxnSpPr>
+          <p:cNvPr id="20" name="Straight Arrow Connector 19">
+            <a:extLst>
+              <a:ext uri="{FF2B5EF4-FFF2-40B4-BE49-F238E27FC236}">
+                <a16:creationId xmlns:a16="http://schemas.microsoft.com/office/drawing/2014/main" id="{CE1BCFB6-8089-D14E-8852-92D67144BB49}"/>
+              </a:ext>
+            </a:extLst>
+          </p:cNvPr>
+          <p:cNvCxnSpPr>
+            <a:endCxn id="8" idx="1"/>
+          </p:cNvCxnSpPr>
+          <p:nvPr/>
+        </p:nvCxnSpPr>
+        <p:spPr>
+          <a:xfrm flipV="1">
+            <a:off x="6743700" y="3932171"/>
+            <a:ext cx="1866900" cy="68329"/>
+          </a:xfrm>
+          <a:prstGeom prst="straightConnector1">
+            <a:avLst/>
+          </a:prstGeom>
+          <a:ln>
+            <a:tailEnd type="triangle"/>
+          </a:ln>
+        </p:spPr>
+        <p:style>
+          <a:lnRef idx="1">
+            <a:schemeClr val="accent1"/>
+          </a:lnRef>
+          <a:fillRef idx="0">
+            <a:schemeClr val="accent1"/>
+          </a:fillRef>
+          <a:effectRef idx="0">
+            <a:schemeClr val="accent1"/>
+          </a:effectRef>
+          <a:fontRef idx="minor">
+            <a:schemeClr val="tx1"/>
+          </a:fontRef>
+        </p:style>
+      </p:cxnSp>
+      <p:sp>
+        <p:nvSpPr>
+          <p:cNvPr id="21" name="TextBox 20">
+            <a:extLst>
+              <a:ext uri="{FF2B5EF4-FFF2-40B4-BE49-F238E27FC236}">
+                <a16:creationId xmlns:a16="http://schemas.microsoft.com/office/drawing/2014/main" id="{CF8CBED9-EFC4-BBEA-5222-8C4A07ABB0CA}"/>
+              </a:ext>
+            </a:extLst>
+          </p:cNvPr>
+          <p:cNvSpPr txBox="1"/>
+          <p:nvPr/>
+        </p:nvSpPr>
+        <p:spPr>
+          <a:xfrm>
+            <a:off x="6096000" y="3932171"/>
+            <a:ext cx="571500" cy="400110"/>
+          </a:xfrm>
+          <a:prstGeom prst="rect">
+            <a:avLst/>
+          </a:prstGeom>
+          <a:noFill/>
+        </p:spPr>
+        <p:txBody>
+          <a:bodyPr wrap="square" rtlCol="0">
+            <a:spAutoFit/>
+          </a:bodyPr>
+          <a:lstStyle/>
+          <a:p>
+            <a:r>
+              <a:rPr lang="en-US" sz="1000" dirty="0"/>
+              <a:t>GPIO 112</a:t>
+            </a:r>
+          </a:p>
+        </p:txBody>
+      </p:sp>
+      <p:cxnSp>
+        <p:nvCxnSpPr>
+          <p:cNvPr id="23" name="Straight Arrow Connector 22">
+            <a:extLst>
+              <a:ext uri="{FF2B5EF4-FFF2-40B4-BE49-F238E27FC236}">
+                <a16:creationId xmlns:a16="http://schemas.microsoft.com/office/drawing/2014/main" id="{9F7506B9-21EA-FBB0-80C7-4F0492F326C6}"/>
+              </a:ext>
+            </a:extLst>
+          </p:cNvPr>
+          <p:cNvCxnSpPr>
+            <a:cxnSpLocks/>
+            <a:endCxn id="3" idx="1"/>
+          </p:cNvCxnSpPr>
+          <p:nvPr/>
+        </p:nvCxnSpPr>
+        <p:spPr>
+          <a:xfrm flipV="1">
+            <a:off x="8067213" y="2389723"/>
+            <a:ext cx="1000586" cy="1252379"/>
+          </a:xfrm>
+          <a:prstGeom prst="straightConnector1">
+            <a:avLst/>
+          </a:prstGeom>
+          <a:ln>
+            <a:tailEnd type="triangle"/>
+          </a:ln>
+        </p:spPr>
+        <p:style>
+          <a:lnRef idx="1">
+            <a:schemeClr val="accent1"/>
+          </a:lnRef>
+          <a:fillRef idx="0">
+            <a:schemeClr val="accent1"/>
+          </a:fillRef>
+          <a:effectRef idx="0">
+            <a:schemeClr val="accent1"/>
+          </a:effectRef>
+          <a:fontRef idx="minor">
+            <a:schemeClr val="tx1"/>
+          </a:fontRef>
+        </p:style>
+      </p:cxnSp>
+      <p:cxnSp>
+        <p:nvCxnSpPr>
+          <p:cNvPr id="30" name="Straight Connector 29">
+            <a:extLst>
+              <a:ext uri="{FF2B5EF4-FFF2-40B4-BE49-F238E27FC236}">
+                <a16:creationId xmlns:a16="http://schemas.microsoft.com/office/drawing/2014/main" id="{7D398719-10F9-BE54-A65F-69F06DC89752}"/>
+              </a:ext>
+            </a:extLst>
+          </p:cNvPr>
+          <p:cNvCxnSpPr>
+            <a:cxnSpLocks/>
+            <a:endCxn id="5" idx="3"/>
+          </p:cNvCxnSpPr>
+          <p:nvPr/>
+        </p:nvCxnSpPr>
+        <p:spPr>
+          <a:xfrm flipH="1" flipV="1">
+            <a:off x="6743700" y="3524250"/>
+            <a:ext cx="1323513" cy="112194"/>
+          </a:xfrm>
+          <a:prstGeom prst="line">
+            <a:avLst/>
+          </a:prstGeom>
+        </p:spPr>
+        <p:style>
+          <a:lnRef idx="1">
+            <a:schemeClr val="accent1"/>
+          </a:lnRef>
+          <a:fillRef idx="0">
+            <a:schemeClr val="accent1"/>
+          </a:fillRef>
+          <a:effectRef idx="0">
+            <a:schemeClr val="accent1"/>
+          </a:effectRef>
+          <a:fontRef idx="minor">
+            <a:schemeClr val="tx1"/>
+          </a:fontRef>
+        </p:style>
+      </p:cxnSp>
+      <p:sp>
+        <p:nvSpPr>
+          <p:cNvPr id="34" name="TextBox 33">
+            <a:extLst>
+              <a:ext uri="{FF2B5EF4-FFF2-40B4-BE49-F238E27FC236}">
+                <a16:creationId xmlns:a16="http://schemas.microsoft.com/office/drawing/2014/main" id="{65F60B10-924C-617F-C951-95D8393F7F49}"/>
+              </a:ext>
+            </a:extLst>
+          </p:cNvPr>
+          <p:cNvSpPr txBox="1"/>
+          <p:nvPr/>
+        </p:nvSpPr>
+        <p:spPr>
+          <a:xfrm>
+            <a:off x="5976707" y="3410440"/>
+            <a:ext cx="990599" cy="246221"/>
+          </a:xfrm>
+          <a:prstGeom prst="rect">
+            <a:avLst/>
+          </a:prstGeom>
+          <a:noFill/>
+        </p:spPr>
+        <p:txBody>
+          <a:bodyPr wrap="square" rtlCol="0">
+            <a:spAutoFit/>
+          </a:bodyPr>
+          <a:lstStyle/>
+          <a:p>
+            <a:r>
+              <a:rPr lang="en-US" sz="1000" dirty="0"/>
+              <a:t>GPIO 64</a:t>
+            </a:r>
+          </a:p>
+        </p:txBody>
+      </p:sp>
+      <p:sp>
+        <p:nvSpPr>
+          <p:cNvPr id="35" name="TextBox 34">
+            <a:extLst>
+              <a:ext uri="{FF2B5EF4-FFF2-40B4-BE49-F238E27FC236}">
+                <a16:creationId xmlns:a16="http://schemas.microsoft.com/office/drawing/2014/main" id="{877C2C31-294F-5C3A-06BD-07EC6B0EAD12}"/>
+              </a:ext>
+            </a:extLst>
+          </p:cNvPr>
+          <p:cNvSpPr txBox="1"/>
+          <p:nvPr/>
+        </p:nvSpPr>
+        <p:spPr>
+          <a:xfrm>
+            <a:off x="8003368" y="729060"/>
+            <a:ext cx="2505814" cy="246221"/>
+          </a:xfrm>
+          <a:prstGeom prst="rect">
+            <a:avLst/>
+          </a:prstGeom>
+          <a:noFill/>
+        </p:spPr>
+        <p:txBody>
+          <a:bodyPr wrap="none" rtlCol="0">
+            <a:spAutoFit/>
+          </a:bodyPr>
+          <a:lstStyle/>
+          <a:p>
+            <a:r>
+              <a:rPr lang="en-US" sz="1000" dirty="0"/>
+              <a:t>Unnecessary if </a:t>
+            </a:r>
+            <a:r>
+              <a:rPr lang="en-US" sz="1000" dirty="0" err="1"/>
+              <a:t>microusb</a:t>
+            </a:r>
+            <a:r>
+              <a:rPr lang="en-US" sz="1000" dirty="0"/>
+              <a:t> port is sufficient</a:t>
+            </a:r>
+          </a:p>
+        </p:txBody>
+      </p:sp>
     </p:spTree>
     <p:extLst>
       <p:ext uri="{BB962C8B-B14F-4D97-AF65-F5344CB8AC3E}">
@@ -16414,7 +16782,7 @@
             <a:pPr algn="ctr"/>
             <a:r>
               <a:rPr lang="en-US" sz="1000" dirty="0"/>
-              <a:t>1.5A stepper motor</a:t>
+              <a:t>1.5A stepper or servo motor</a:t>
             </a:r>
           </a:p>
         </p:txBody>
@@ -16689,6 +17057,7 @@
             </a:extLst>
           </p:cNvPr>
           <p:cNvCxnSpPr>
+            <a:cxnSpLocks/>
             <a:stCxn id="10" idx="1"/>
             <a:endCxn id="11" idx="3"/>
           </p:cNvCxnSpPr>
@@ -16731,6 +17100,7 @@
             </a:extLst>
           </p:cNvPr>
           <p:cNvCxnSpPr>
+            <a:cxnSpLocks/>
             <a:stCxn id="13" idx="3"/>
             <a:endCxn id="9" idx="1"/>
           </p:cNvCxnSpPr>
@@ -16808,6 +17178,7 @@
             </a:extLst>
           </p:cNvPr>
           <p:cNvCxnSpPr>
+            <a:cxnSpLocks/>
             <a:stCxn id="12" idx="1"/>
           </p:cNvCxnSpPr>
           <p:nvPr/>
@@ -17097,6 +17468,400 @@
           </a:p>
         </p:txBody>
       </p:sp>
+      <p:sp>
+        <p:nvSpPr>
+          <p:cNvPr id="3" name="Rectangle 2">
+            <a:extLst>
+              <a:ext uri="{FF2B5EF4-FFF2-40B4-BE49-F238E27FC236}">
+                <a16:creationId xmlns:a16="http://schemas.microsoft.com/office/drawing/2014/main" id="{17EC81C8-6620-1996-16C1-B833D2155E49}"/>
+              </a:ext>
+            </a:extLst>
+          </p:cNvPr>
+          <p:cNvSpPr/>
+          <p:nvPr/>
+        </p:nvSpPr>
+        <p:spPr>
+          <a:xfrm>
+            <a:off x="9114217" y="1606070"/>
+            <a:ext cx="1165381" cy="1045647"/>
+          </a:xfrm>
+          <a:prstGeom prst="rect">
+            <a:avLst/>
+          </a:prstGeom>
+        </p:spPr>
+        <p:style>
+          <a:lnRef idx="2">
+            <a:schemeClr val="accent1">
+              <a:shade val="15000"/>
+            </a:schemeClr>
+          </a:lnRef>
+          <a:fillRef idx="1">
+            <a:schemeClr val="accent1"/>
+          </a:fillRef>
+          <a:effectRef idx="0">
+            <a:schemeClr val="accent1"/>
+          </a:effectRef>
+          <a:fontRef idx="minor">
+            <a:schemeClr val="lt1"/>
+          </a:fontRef>
+        </p:style>
+        <p:txBody>
+          <a:bodyPr rtlCol="0" anchor="ctr"/>
+          <a:lstStyle/>
+          <a:p>
+            <a:pPr algn="ctr"/>
+            <a:r>
+              <a:rPr lang="en-US" sz="1000" dirty="0"/>
+              <a:t>Emergency stop button</a:t>
+            </a:r>
+          </a:p>
+        </p:txBody>
+      </p:sp>
+      <p:sp>
+        <p:nvSpPr>
+          <p:cNvPr id="4" name="Rectangle 3">
+            <a:extLst>
+              <a:ext uri="{FF2B5EF4-FFF2-40B4-BE49-F238E27FC236}">
+                <a16:creationId xmlns:a16="http://schemas.microsoft.com/office/drawing/2014/main" id="{02B16D04-061B-7A92-69E8-11F3F0B4AF53}"/>
+              </a:ext>
+            </a:extLst>
+          </p:cNvPr>
+          <p:cNvSpPr/>
+          <p:nvPr/>
+        </p:nvSpPr>
+        <p:spPr>
+          <a:xfrm>
+            <a:off x="8657018" y="3148518"/>
+            <a:ext cx="1165381" cy="1045647"/>
+          </a:xfrm>
+          <a:prstGeom prst="rect">
+            <a:avLst/>
+          </a:prstGeom>
+        </p:spPr>
+        <p:style>
+          <a:lnRef idx="2">
+            <a:schemeClr val="accent1">
+              <a:shade val="15000"/>
+            </a:schemeClr>
+          </a:lnRef>
+          <a:fillRef idx="1">
+            <a:schemeClr val="accent1"/>
+          </a:fillRef>
+          <a:effectRef idx="0">
+            <a:schemeClr val="accent1"/>
+          </a:effectRef>
+          <a:fontRef idx="minor">
+            <a:schemeClr val="lt1"/>
+          </a:fontRef>
+        </p:style>
+        <p:txBody>
+          <a:bodyPr rtlCol="0" anchor="ctr"/>
+          <a:lstStyle/>
+          <a:p>
+            <a:pPr algn="ctr"/>
+            <a:r>
+              <a:rPr lang="en-US" sz="1000" dirty="0"/>
+              <a:t>Fan Speed level interface</a:t>
+            </a:r>
+          </a:p>
+        </p:txBody>
+      </p:sp>
+      <p:sp>
+        <p:nvSpPr>
+          <p:cNvPr id="5" name="TextBox 4">
+            <a:extLst>
+              <a:ext uri="{FF2B5EF4-FFF2-40B4-BE49-F238E27FC236}">
+                <a16:creationId xmlns:a16="http://schemas.microsoft.com/office/drawing/2014/main" id="{02A921EB-3969-C4AC-8CD3-B7F2571194B8}"/>
+              </a:ext>
+            </a:extLst>
+          </p:cNvPr>
+          <p:cNvSpPr txBox="1"/>
+          <p:nvPr/>
+        </p:nvSpPr>
+        <p:spPr>
+          <a:xfrm>
+            <a:off x="9952418" y="3381273"/>
+            <a:ext cx="2019300" cy="461665"/>
+          </a:xfrm>
+          <a:prstGeom prst="rect">
+            <a:avLst/>
+          </a:prstGeom>
+          <a:noFill/>
+        </p:spPr>
+        <p:txBody>
+          <a:bodyPr wrap="square" rtlCol="0">
+            <a:spAutoFit/>
+          </a:bodyPr>
+          <a:lstStyle/>
+          <a:p>
+            <a:r>
+              <a:rPr lang="en-US" sz="1200" dirty="0"/>
+              <a:t>Using either the number display or a series of LEDs</a:t>
+            </a:r>
+          </a:p>
+        </p:txBody>
+      </p:sp>
+      <p:cxnSp>
+        <p:nvCxnSpPr>
+          <p:cNvPr id="58" name="Straight Arrow Connector 57">
+            <a:extLst>
+              <a:ext uri="{FF2B5EF4-FFF2-40B4-BE49-F238E27FC236}">
+                <a16:creationId xmlns:a16="http://schemas.microsoft.com/office/drawing/2014/main" id="{EDE2D0DD-E6DC-DF87-AC4E-62ADEB513C60}"/>
+              </a:ext>
+            </a:extLst>
+          </p:cNvPr>
+          <p:cNvCxnSpPr/>
+          <p:nvPr/>
+        </p:nvCxnSpPr>
+        <p:spPr>
+          <a:xfrm>
+            <a:off x="6934200" y="4724400"/>
+            <a:ext cx="2180017" cy="0"/>
+          </a:xfrm>
+          <a:prstGeom prst="straightConnector1">
+            <a:avLst/>
+          </a:prstGeom>
+          <a:ln>
+            <a:tailEnd type="triangle"/>
+          </a:ln>
+        </p:spPr>
+        <p:style>
+          <a:lnRef idx="1">
+            <a:schemeClr val="accent1"/>
+          </a:lnRef>
+          <a:fillRef idx="0">
+            <a:schemeClr val="accent1"/>
+          </a:fillRef>
+          <a:effectRef idx="0">
+            <a:schemeClr val="accent1"/>
+          </a:effectRef>
+          <a:fontRef idx="minor">
+            <a:schemeClr val="tx1"/>
+          </a:fontRef>
+        </p:style>
+      </p:cxnSp>
+      <p:cxnSp>
+        <p:nvCxnSpPr>
+          <p:cNvPr id="60" name="Straight Arrow Connector 59">
+            <a:extLst>
+              <a:ext uri="{FF2B5EF4-FFF2-40B4-BE49-F238E27FC236}">
+                <a16:creationId xmlns:a16="http://schemas.microsoft.com/office/drawing/2014/main" id="{4B935F8A-2730-7B4E-6266-0B67ABB5B8BF}"/>
+              </a:ext>
+            </a:extLst>
+          </p:cNvPr>
+          <p:cNvCxnSpPr>
+            <a:endCxn id="4" idx="2"/>
+          </p:cNvCxnSpPr>
+          <p:nvPr/>
+        </p:nvCxnSpPr>
+        <p:spPr>
+          <a:xfrm flipV="1">
+            <a:off x="9114217" y="4194165"/>
+            <a:ext cx="125492" cy="530235"/>
+          </a:xfrm>
+          <a:prstGeom prst="straightConnector1">
+            <a:avLst/>
+          </a:prstGeom>
+          <a:ln>
+            <a:tailEnd type="triangle"/>
+          </a:ln>
+        </p:spPr>
+        <p:style>
+          <a:lnRef idx="1">
+            <a:schemeClr val="accent1"/>
+          </a:lnRef>
+          <a:fillRef idx="0">
+            <a:schemeClr val="accent1"/>
+          </a:fillRef>
+          <a:effectRef idx="0">
+            <a:schemeClr val="accent1"/>
+          </a:effectRef>
+          <a:fontRef idx="minor">
+            <a:schemeClr val="tx1"/>
+          </a:fontRef>
+        </p:style>
+      </p:cxnSp>
+      <p:cxnSp>
+        <p:nvCxnSpPr>
+          <p:cNvPr id="62" name="Straight Arrow Connector 61">
+            <a:extLst>
+              <a:ext uri="{FF2B5EF4-FFF2-40B4-BE49-F238E27FC236}">
+                <a16:creationId xmlns:a16="http://schemas.microsoft.com/office/drawing/2014/main" id="{AB76F803-966F-2B66-4294-31569A1A24F3}"/>
+              </a:ext>
+            </a:extLst>
+          </p:cNvPr>
+          <p:cNvCxnSpPr>
+            <a:endCxn id="3" idx="2"/>
+          </p:cNvCxnSpPr>
+          <p:nvPr/>
+        </p:nvCxnSpPr>
+        <p:spPr>
+          <a:xfrm flipV="1">
+            <a:off x="6934200" y="2651717"/>
+            <a:ext cx="2762708" cy="1542448"/>
+          </a:xfrm>
+          <a:prstGeom prst="straightConnector1">
+            <a:avLst/>
+          </a:prstGeom>
+          <a:ln>
+            <a:tailEnd type="triangle"/>
+          </a:ln>
+        </p:spPr>
+        <p:style>
+          <a:lnRef idx="1">
+            <a:schemeClr val="accent1"/>
+          </a:lnRef>
+          <a:fillRef idx="0">
+            <a:schemeClr val="accent1"/>
+          </a:fillRef>
+          <a:effectRef idx="0">
+            <a:schemeClr val="accent1"/>
+          </a:effectRef>
+          <a:fontRef idx="minor">
+            <a:schemeClr val="tx1"/>
+          </a:fontRef>
+        </p:style>
+      </p:cxnSp>
+      <p:sp>
+        <p:nvSpPr>
+          <p:cNvPr id="63" name="TextBox 62">
+            <a:extLst>
+              <a:ext uri="{FF2B5EF4-FFF2-40B4-BE49-F238E27FC236}">
+                <a16:creationId xmlns:a16="http://schemas.microsoft.com/office/drawing/2014/main" id="{5D2792BD-2651-DD1B-0150-4BCABA51D18E}"/>
+              </a:ext>
+            </a:extLst>
+          </p:cNvPr>
+          <p:cNvSpPr txBox="1"/>
+          <p:nvPr/>
+        </p:nvSpPr>
+        <p:spPr>
+          <a:xfrm>
+            <a:off x="6172198" y="4076700"/>
+            <a:ext cx="762002" cy="400110"/>
+          </a:xfrm>
+          <a:prstGeom prst="rect">
+            <a:avLst/>
+          </a:prstGeom>
+          <a:noFill/>
+        </p:spPr>
+        <p:txBody>
+          <a:bodyPr wrap="square" rtlCol="0">
+            <a:spAutoFit/>
+          </a:bodyPr>
+          <a:lstStyle/>
+          <a:p>
+            <a:r>
+              <a:rPr lang="en-US" sz="1000" dirty="0"/>
+              <a:t>GPIO 64 (P 2.20)</a:t>
+            </a:r>
+          </a:p>
+        </p:txBody>
+      </p:sp>
+      <p:sp>
+        <p:nvSpPr>
+          <p:cNvPr id="64" name="TextBox 63">
+            <a:extLst>
+              <a:ext uri="{FF2B5EF4-FFF2-40B4-BE49-F238E27FC236}">
+                <a16:creationId xmlns:a16="http://schemas.microsoft.com/office/drawing/2014/main" id="{C0F85989-E476-B575-0E87-1B2C0124DD82}"/>
+              </a:ext>
+            </a:extLst>
+          </p:cNvPr>
+          <p:cNvSpPr txBox="1"/>
+          <p:nvPr/>
+        </p:nvSpPr>
+        <p:spPr>
+          <a:xfrm>
+            <a:off x="6074242" y="4601963"/>
+            <a:ext cx="762002" cy="400110"/>
+          </a:xfrm>
+          <a:prstGeom prst="rect">
+            <a:avLst/>
+          </a:prstGeom>
+          <a:noFill/>
+        </p:spPr>
+        <p:txBody>
+          <a:bodyPr wrap="square" rtlCol="0">
+            <a:spAutoFit/>
+          </a:bodyPr>
+          <a:lstStyle/>
+          <a:p>
+            <a:r>
+              <a:rPr lang="en-US" sz="1000" dirty="0"/>
+              <a:t>GPIO 112 (P 2.32)</a:t>
+            </a:r>
+          </a:p>
+        </p:txBody>
+      </p:sp>
+      <p:sp>
+        <p:nvSpPr>
+          <p:cNvPr id="65" name="TextBox 64">
+            <a:extLst>
+              <a:ext uri="{FF2B5EF4-FFF2-40B4-BE49-F238E27FC236}">
+                <a16:creationId xmlns:a16="http://schemas.microsoft.com/office/drawing/2014/main" id="{4096BA3C-9F27-53A4-64F1-025DDC92E4F8}"/>
+              </a:ext>
+            </a:extLst>
+          </p:cNvPr>
+          <p:cNvSpPr txBox="1"/>
+          <p:nvPr/>
+        </p:nvSpPr>
+        <p:spPr>
+          <a:xfrm>
+            <a:off x="8496300" y="2764205"/>
+            <a:ext cx="617917" cy="246221"/>
+          </a:xfrm>
+          <a:prstGeom prst="rect">
+            <a:avLst/>
+          </a:prstGeom>
+          <a:noFill/>
+        </p:spPr>
+        <p:txBody>
+          <a:bodyPr wrap="square" rtlCol="0">
+            <a:spAutoFit/>
+          </a:bodyPr>
+          <a:lstStyle/>
+          <a:p>
+            <a:r>
+              <a:rPr lang="en-US" sz="1000" dirty="0"/>
+              <a:t>3.3 V</a:t>
+            </a:r>
+          </a:p>
+        </p:txBody>
+      </p:sp>
+      <p:sp>
+        <p:nvSpPr>
+          <p:cNvPr id="66" name="TextBox 65">
+            <a:extLst>
+              <a:ext uri="{FF2B5EF4-FFF2-40B4-BE49-F238E27FC236}">
+                <a16:creationId xmlns:a16="http://schemas.microsoft.com/office/drawing/2014/main" id="{F151BFFE-1FCB-F44B-3DD8-CD269882B2BD}"/>
+              </a:ext>
+            </a:extLst>
+          </p:cNvPr>
+          <p:cNvSpPr txBox="1"/>
+          <p:nvPr/>
+        </p:nvSpPr>
+        <p:spPr>
+          <a:xfrm>
+            <a:off x="7873866" y="4423332"/>
+            <a:ext cx="571500" cy="253916"/>
+          </a:xfrm>
+          <a:prstGeom prst="rect">
+            <a:avLst/>
+          </a:prstGeom>
+          <a:noFill/>
+        </p:spPr>
+        <p:txBody>
+          <a:bodyPr wrap="square" rtlCol="0">
+            <a:spAutoFit/>
+          </a:bodyPr>
+          <a:lstStyle/>
+          <a:p>
+            <a:r>
+              <a:rPr lang="en-US" sz="1000" dirty="0"/>
+              <a:t>5 V</a:t>
+            </a:r>
+          </a:p>
+        </p:txBody>
+      </p:sp>
     </p:spTree>
     <p:extLst>
       <p:ext uri="{BB962C8B-B14F-4D97-AF65-F5344CB8AC3E}">
@@ -17183,7 +17948,7 @@
             <p:ph idx="1"/>
             <p:extLst>
               <p:ext uri="{D42A27DB-BD31-4B8C-83A1-F6EECF244321}">
-                <p14:modId xmlns:p14="http://schemas.microsoft.com/office/powerpoint/2010/main" val="2870445798"/>
+                <p14:modId xmlns:p14="http://schemas.microsoft.com/office/powerpoint/2010/main" val="1167666734"/>
               </p:ext>
             </p:extLst>
           </p:nvPr>
@@ -17291,7 +18056,7 @@
                         <a:defRPr/>
                       </a:pPr>
                       <a:r>
-                        <a:rPr lang="en-US" sz="1800" b="0" i="0" kern="1200" dirty="0" err="1">
+                        <a:rPr lang="en-US" sz="1800" b="0" i="0" strike="sngStrike" kern="1200" dirty="0" err="1">
                           <a:solidFill>
                             <a:schemeClr val="tx1"/>
                           </a:solidFill>
@@ -17303,7 +18068,7 @@
                         <a:t>HiLetgo</a:t>
                       </a:r>
                       <a:r>
-                        <a:rPr lang="en-US" sz="1800" b="0" i="0" kern="1200" dirty="0">
+                        <a:rPr lang="en-US" sz="1800" b="0" i="0" strike="sngStrike" kern="1200" dirty="0">
                           <a:solidFill>
                             <a:schemeClr val="tx1"/>
                           </a:solidFill>
@@ -17315,7 +18080,7 @@
                         <a:t> </a:t>
                       </a:r>
                       <a:r>
-                        <a:rPr lang="en-US" sz="1800" b="0" i="0" kern="1200" dirty="0" err="1">
+                        <a:rPr lang="en-US" sz="1800" b="0" i="0" strike="sngStrike" kern="1200" dirty="0" err="1">
                           <a:solidFill>
                             <a:schemeClr val="tx1"/>
                           </a:solidFill>
@@ -17327,7 +18092,7 @@
                         <a:t>Stepstick</a:t>
                       </a:r>
                       <a:r>
-                        <a:rPr lang="en-US" sz="1800" b="0" i="0" kern="1200" dirty="0">
+                        <a:rPr lang="en-US" sz="1800" b="0" i="0" strike="sngStrike" kern="1200" dirty="0">
                           <a:solidFill>
                             <a:schemeClr val="tx1"/>
                           </a:solidFill>
@@ -17358,7 +18123,7 @@
                         <a:defRPr/>
                       </a:pPr>
                       <a:r>
-                        <a:rPr lang="en-US" sz="1800" b="0" i="0" kern="1200" dirty="0">
+                        <a:rPr lang="en-US" sz="1800" b="0" i="0" strike="sngStrike" kern="1200" dirty="0">
                           <a:solidFill>
                             <a:schemeClr val="tx1"/>
                           </a:solidFill>
@@ -17379,7 +18144,7 @@
                     <a:lstStyle/>
                     <a:p>
                       <a:r>
-                        <a:rPr lang="en-US" dirty="0"/>
+                        <a:rPr lang="en-US" strike="sngStrike" dirty="0"/>
                         <a:t>1?</a:t>
                       </a:r>
                     </a:p>
@@ -17392,7 +18157,7 @@
                     <a:lstStyle/>
                     <a:p>
                       <a:r>
-                        <a:rPr lang="en-US" dirty="0"/>
+                        <a:rPr lang="en-US" strike="sngStrike" dirty="0"/>
                         <a:t>$10.19 (5)</a:t>
                       </a:r>
                     </a:p>
@@ -17462,7 +18227,7 @@
                           <a:ea typeface="+mn-ea"/>
                           <a:cs typeface="+mn-cs"/>
                         </a:rPr>
-                        <a:t> 17 Stepper Motor Bipolar 1.5A 30Ncm with 1 Meter Cable for 3D Printer CNC </a:t>
+                        <a:t> 17 Stepper Motor Bipolar 1.5A 30Ncm with 1 Meter Cable for 3D Printer CNC or alternative </a:t>
                       </a:r>
                     </a:p>
                     <a:p>
@@ -17640,13 +18405,13 @@
                     <a:lstStyle/>
                     <a:p>
                       <a:r>
-                        <a:rPr lang="en-US" dirty="0"/>
+                        <a:rPr lang="en-US" strike="sngStrike" dirty="0"/>
                         <a:t>USB female socket</a:t>
                       </a:r>
                     </a:p>
                     <a:p>
                       <a:r>
-                        <a:rPr lang="en-US" dirty="0"/>
+                        <a:rPr lang="en-US" strike="sngStrike" dirty="0"/>
                         <a:t>https://a.co/d/cLsgAAR</a:t>
                       </a:r>
                     </a:p>
@@ -17659,7 +18424,7 @@
                     <a:lstStyle/>
                     <a:p>
                       <a:r>
-                        <a:rPr lang="en-US" dirty="0"/>
+                        <a:rPr lang="en-US" strike="sngStrike" dirty="0"/>
                         <a:t>1</a:t>
                       </a:r>
                     </a:p>
@@ -17672,7 +18437,7 @@
                     <a:lstStyle/>
                     <a:p>
                       <a:r>
-                        <a:rPr lang="en-US" dirty="0"/>
+                        <a:rPr lang="en-US" strike="sngStrike" dirty="0"/>
                         <a:t>~$6.99</a:t>
                       </a:r>
                     </a:p>

</xml_diff>